<commit_message>
update ritt cloud docs
</commit_message>
<xml_diff>
--- a/ritt documentation.pptx
+++ b/ritt documentation.pptx
@@ -62,6 +62,7 @@
     <p:sldId id="315" r:id="rId56"/>
     <p:sldId id="316" r:id="rId57"/>
     <p:sldId id="318" r:id="rId58"/>
+    <p:sldId id="319" r:id="rId59"/>
   </p:sldIdLst>
   <p:sldSz cx="12192000" cy="6858000"/>
   <p:notesSz cx="6858000" cy="9144000"/>
@@ -226,6 +227,7 @@
             <p14:sldId id="315"/>
             <p14:sldId id="316"/>
             <p14:sldId id="318"/>
+            <p14:sldId id="319"/>
           </p14:sldIdLst>
         </p14:section>
       </p14:sectionLst>
@@ -240,7 +242,7 @@
 <file path=ppt/revisionInfo.xml><?xml version="1.0" encoding="utf-8"?>
 <p1510:revInfo xmlns:a="http://schemas.openxmlformats.org/drawingml/2006/main" xmlns:r="http://schemas.openxmlformats.org/officeDocument/2006/relationships" xmlns:p1510="http://schemas.microsoft.com/office/powerpoint/2015/10/main">
   <p1510:revLst>
-    <p1510:client id="{D6575B3A-B725-447A-9C7F-0BFAB7C7F598}" v="10" dt="2024-01-13T06:13:48.391"/>
+    <p1510:client id="{D6575B3A-B725-447A-9C7F-0BFAB7C7F598}" v="11" dt="2024-01-24T05:15:45.454"/>
   </p1510:revLst>
 </p1510:revInfo>
 </file>
@@ -250,7 +252,7 @@
   <pc:docChgLst>
     <pc:chgData name="Joyce Liu" userId="7a6abec90a840b33" providerId="LiveId" clId="{D6575B3A-B725-447A-9C7F-0BFAB7C7F598}"/>
     <pc:docChg chg="modSld">
-      <pc:chgData name="Joyce Liu" userId="7a6abec90a840b33" providerId="LiveId" clId="{D6575B3A-B725-447A-9C7F-0BFAB7C7F598}" dt="2024-01-13T06:13:48.391" v="9"/>
+      <pc:chgData name="Joyce Liu" userId="7a6abec90a840b33" providerId="LiveId" clId="{D6575B3A-B725-447A-9C7F-0BFAB7C7F598}" dt="2024-01-24T05:15:45.454" v="10"/>
       <pc:docMkLst>
         <pc:docMk/>
       </pc:docMkLst>
@@ -859,6 +861,21 @@
             <ac:picMk id="12" creationId="{4A559851-C72F-A90E-DF7D-8A8131205C9C}"/>
           </ac:picMkLst>
         </pc:picChg>
+      </pc:sldChg>
+      <pc:sldChg chg="addSp modSp">
+        <pc:chgData name="Joyce Liu" userId="7a6abec90a840b33" providerId="LiveId" clId="{D6575B3A-B725-447A-9C7F-0BFAB7C7F598}" dt="2024-01-24T05:15:45.454" v="10"/>
+        <pc:sldMkLst>
+          <pc:docMk/>
+          <pc:sldMk cId="2943102853" sldId="319"/>
+        </pc:sldMkLst>
+        <pc:spChg chg="add mod">
+          <ac:chgData name="Joyce Liu" userId="7a6abec90a840b33" providerId="LiveId" clId="{D6575B3A-B725-447A-9C7F-0BFAB7C7F598}" dt="2024-01-24T05:15:45.454" v="10"/>
+          <ac:spMkLst>
+            <pc:docMk/>
+            <pc:sldMk cId="2943102853" sldId="319"/>
+            <ac:spMk id="4" creationId="{B5A9ABA2-1093-9A55-C02F-0BD32E7FB60D}"/>
+          </ac:spMkLst>
+        </pc:spChg>
       </pc:sldChg>
     </pc:docChg>
   </pc:docChgLst>
@@ -30246,6 +30263,101 @@
 </p:sld>
 </file>
 
+<file path=ppt/slides/slide58.xml><?xml version="1.0" encoding="utf-8"?>
+<p:sld xmlns:a="http://schemas.openxmlformats.org/drawingml/2006/main" xmlns:r="http://schemas.openxmlformats.org/officeDocument/2006/relationships" xmlns:p="http://schemas.openxmlformats.org/presentationml/2006/main">
+  <p:cSld>
+    <p:spTree>
+      <p:nvGrpSpPr>
+        <p:cNvPr id="1" name=""/>
+        <p:cNvGrpSpPr/>
+        <p:nvPr/>
+      </p:nvGrpSpPr>
+      <p:grpSpPr>
+        <a:xfrm>
+          <a:off x="0" y="0"/>
+          <a:ext cx="0" cy="0"/>
+          <a:chOff x="0" y="0"/>
+          <a:chExt cx="0" cy="0"/>
+        </a:xfrm>
+      </p:grpSpPr>
+      <p:pic>
+        <p:nvPicPr>
+          <p:cNvPr id="3" name="Picture 2">
+            <a:extLst>
+              <a:ext uri="{FF2B5EF4-FFF2-40B4-BE49-F238E27FC236}">
+                <a16:creationId xmlns:a16="http://schemas.microsoft.com/office/drawing/2014/main" id="{FD913A9D-E6B9-5781-8FA2-28BE1924C759}"/>
+              </a:ext>
+            </a:extLst>
+          </p:cNvPr>
+          <p:cNvPicPr>
+            <a:picLocks noChangeAspect="1"/>
+          </p:cNvPicPr>
+          <p:nvPr/>
+        </p:nvPicPr>
+        <p:blipFill>
+          <a:blip r:embed="rId2"/>
+          <a:stretch>
+            <a:fillRect/>
+          </a:stretch>
+        </p:blipFill>
+        <p:spPr>
+          <a:xfrm>
+            <a:off x="3376233" y="2709762"/>
+            <a:ext cx="5439534" cy="1438476"/>
+          </a:xfrm>
+          <a:prstGeom prst="rect">
+            <a:avLst/>
+          </a:prstGeom>
+        </p:spPr>
+      </p:pic>
+      <p:sp>
+        <p:nvSpPr>
+          <p:cNvPr id="4" name="TextBox 3">
+            <a:extLst>
+              <a:ext uri="{FF2B5EF4-FFF2-40B4-BE49-F238E27FC236}">
+                <a16:creationId xmlns:a16="http://schemas.microsoft.com/office/drawing/2014/main" id="{B5A9ABA2-1093-9A55-C02F-0BD32E7FB60D}"/>
+              </a:ext>
+            </a:extLst>
+          </p:cNvPr>
+          <p:cNvSpPr txBox="1"/>
+          <p:nvPr/>
+        </p:nvSpPr>
+        <p:spPr>
+          <a:xfrm>
+            <a:off x="1598724" y="714205"/>
+            <a:ext cx="2890791" cy="369332"/>
+          </a:xfrm>
+          <a:prstGeom prst="rect">
+            <a:avLst/>
+          </a:prstGeom>
+          <a:noFill/>
+        </p:spPr>
+        <p:txBody>
+          <a:bodyPr wrap="none" rtlCol="0">
+            <a:spAutoFit/>
+          </a:bodyPr>
+          <a:lstStyle/>
+          <a:p>
+            <a:r>
+              <a:rPr lang="en-SG" dirty="0"/>
+              <a:t>v1.2-PNG-Ritt-Cloud-Settings</a:t>
+            </a:r>
+          </a:p>
+        </p:txBody>
+      </p:sp>
+    </p:spTree>
+    <p:extLst>
+      <p:ext uri="{BB962C8B-B14F-4D97-AF65-F5344CB8AC3E}">
+        <p14:creationId xmlns:p14="http://schemas.microsoft.com/office/powerpoint/2010/main" val="2943102853"/>
+      </p:ext>
+    </p:extLst>
+  </p:cSld>
+  <p:clrMapOvr>
+    <a:masterClrMapping/>
+  </p:clrMapOvr>
+</p:sld>
+</file>
+
 <file path=ppt/slides/slide6.xml><?xml version="1.0" encoding="utf-8"?>
 <p:sld xmlns:a="http://schemas.openxmlformats.org/drawingml/2006/main" xmlns:r="http://schemas.openxmlformats.org/officeDocument/2006/relationships" xmlns:p="http://schemas.openxmlformats.org/presentationml/2006/main">
   <p:cSld>

</xml_diff>